<commit_message>
Added an assimp helper library
</commit_message>
<xml_diff>
--- a/6028_Graph_1/D2D/W02/Presentation1.pptx
+++ b/6028_Graph_1/D2D/W02/Presentation1.pptx
@@ -6,8 +6,10 @@
   </p:sldMasterIdLst>
   <p:sldIdLst>
     <p:sldId id="256" r:id="rId2"/>
-    <p:sldId id="257" r:id="rId3"/>
-    <p:sldId id="258" r:id="rId4"/>
+    <p:sldId id="260" r:id="rId3"/>
+    <p:sldId id="257" r:id="rId4"/>
+    <p:sldId id="259" r:id="rId5"/>
+    <p:sldId id="258" r:id="rId6"/>
   </p:sldIdLst>
   <p:sldSz cx="12192000" cy="6858000"/>
   <p:notesSz cx="6858000" cy="9144000"/>
@@ -106,6 +108,11 @@
       </a:defRPr>
     </a:lvl9pPr>
   </p:defaultTextStyle>
+  <p:extLst>
+    <p:ext uri="{EFAFB233-063F-42B5-8137-9DF3F51BA10A}">
+      <p15:sldGuideLst xmlns:p15="http://schemas.microsoft.com/office/powerpoint/2012/main"/>
+    </p:ext>
+  </p:extLst>
 </p:presentation>
 </file>
 
@@ -258,7 +265,7 @@
           <a:p>
             <a:fld id="{DC25EA0E-EDF3-4322-872F-1B586758AB3A}" type="datetimeFigureOut">
               <a:rPr lang="en-CA" smtClean="0"/>
-              <a:t>2023-09-08</a:t>
+              <a:t>2023-09-14</a:t>
             </a:fld>
             <a:endParaRPr lang="en-CA"/>
           </a:p>
@@ -458,7 +465,7 @@
           <a:p>
             <a:fld id="{DC25EA0E-EDF3-4322-872F-1B586758AB3A}" type="datetimeFigureOut">
               <a:rPr lang="en-CA" smtClean="0"/>
-              <a:t>2023-09-08</a:t>
+              <a:t>2023-09-14</a:t>
             </a:fld>
             <a:endParaRPr lang="en-CA"/>
           </a:p>
@@ -668,7 +675,7 @@
           <a:p>
             <a:fld id="{DC25EA0E-EDF3-4322-872F-1B586758AB3A}" type="datetimeFigureOut">
               <a:rPr lang="en-CA" smtClean="0"/>
-              <a:t>2023-09-08</a:t>
+              <a:t>2023-09-14</a:t>
             </a:fld>
             <a:endParaRPr lang="en-CA"/>
           </a:p>
@@ -868,7 +875,7 @@
           <a:p>
             <a:fld id="{DC25EA0E-EDF3-4322-872F-1B586758AB3A}" type="datetimeFigureOut">
               <a:rPr lang="en-CA" smtClean="0"/>
-              <a:t>2023-09-08</a:t>
+              <a:t>2023-09-14</a:t>
             </a:fld>
             <a:endParaRPr lang="en-CA"/>
           </a:p>
@@ -1144,7 +1151,7 @@
           <a:p>
             <a:fld id="{DC25EA0E-EDF3-4322-872F-1B586758AB3A}" type="datetimeFigureOut">
               <a:rPr lang="en-CA" smtClean="0"/>
-              <a:t>2023-09-08</a:t>
+              <a:t>2023-09-14</a:t>
             </a:fld>
             <a:endParaRPr lang="en-CA"/>
           </a:p>
@@ -1412,7 +1419,7 @@
           <a:p>
             <a:fld id="{DC25EA0E-EDF3-4322-872F-1B586758AB3A}" type="datetimeFigureOut">
               <a:rPr lang="en-CA" smtClean="0"/>
-              <a:t>2023-09-08</a:t>
+              <a:t>2023-09-14</a:t>
             </a:fld>
             <a:endParaRPr lang="en-CA"/>
           </a:p>
@@ -1827,7 +1834,7 @@
           <a:p>
             <a:fld id="{DC25EA0E-EDF3-4322-872F-1B586758AB3A}" type="datetimeFigureOut">
               <a:rPr lang="en-CA" smtClean="0"/>
-              <a:t>2023-09-08</a:t>
+              <a:t>2023-09-14</a:t>
             </a:fld>
             <a:endParaRPr lang="en-CA"/>
           </a:p>
@@ -1969,7 +1976,7 @@
           <a:p>
             <a:fld id="{DC25EA0E-EDF3-4322-872F-1B586758AB3A}" type="datetimeFigureOut">
               <a:rPr lang="en-CA" smtClean="0"/>
-              <a:t>2023-09-08</a:t>
+              <a:t>2023-09-14</a:t>
             </a:fld>
             <a:endParaRPr lang="en-CA"/>
           </a:p>
@@ -2082,7 +2089,7 @@
           <a:p>
             <a:fld id="{DC25EA0E-EDF3-4322-872F-1B586758AB3A}" type="datetimeFigureOut">
               <a:rPr lang="en-CA" smtClean="0"/>
-              <a:t>2023-09-08</a:t>
+              <a:t>2023-09-14</a:t>
             </a:fld>
             <a:endParaRPr lang="en-CA"/>
           </a:p>
@@ -2395,7 +2402,7 @@
           <a:p>
             <a:fld id="{DC25EA0E-EDF3-4322-872F-1B586758AB3A}" type="datetimeFigureOut">
               <a:rPr lang="en-CA" smtClean="0"/>
-              <a:t>2023-09-08</a:t>
+              <a:t>2023-09-14</a:t>
             </a:fld>
             <a:endParaRPr lang="en-CA"/>
           </a:p>
@@ -2684,7 +2691,7 @@
           <a:p>
             <a:fld id="{DC25EA0E-EDF3-4322-872F-1B586758AB3A}" type="datetimeFigureOut">
               <a:rPr lang="en-CA" smtClean="0"/>
-              <a:t>2023-09-08</a:t>
+              <a:t>2023-09-14</a:t>
             </a:fld>
             <a:endParaRPr lang="en-CA"/>
           </a:p>
@@ -2927,7 +2934,7 @@
           <a:p>
             <a:fld id="{DC25EA0E-EDF3-4322-872F-1B586758AB3A}" type="datetimeFigureOut">
               <a:rPr lang="en-CA" smtClean="0"/>
-              <a:t>2023-09-08</a:t>
+              <a:t>2023-09-14</a:t>
             </a:fld>
             <a:endParaRPr lang="en-CA"/>
           </a:p>
@@ -3584,6 +3591,440 @@
         </p:nvSpPr>
         <p:spPr>
           <a:xfrm>
+            <a:off x="8990219" y="1982502"/>
+            <a:ext cx="2584579" cy="2547841"/>
+          </a:xfrm>
+          <a:prstGeom prst="ellipse">
+            <a:avLst/>
+          </a:prstGeom>
+        </p:spPr>
+        <p:style>
+          <a:lnRef idx="1">
+            <a:schemeClr val="accent4"/>
+          </a:lnRef>
+          <a:fillRef idx="2">
+            <a:schemeClr val="accent4"/>
+          </a:fillRef>
+          <a:effectRef idx="1">
+            <a:schemeClr val="accent4"/>
+          </a:effectRef>
+          <a:fontRef idx="minor">
+            <a:schemeClr val="dk1"/>
+          </a:fontRef>
+        </p:style>
+        <p:txBody>
+          <a:bodyPr rtlCol="0" anchor="ctr"/>
+          <a:lstStyle/>
+          <a:p>
+            <a:pPr algn="ctr"/>
+            <a:r>
+              <a:rPr lang="en-CA" dirty="0"/>
+              <a:t>The Shader</a:t>
+            </a:r>
+          </a:p>
+        </p:txBody>
+      </p:sp>
+      <p:sp>
+        <p:nvSpPr>
+          <p:cNvPr id="6" name="Oval 5">
+            <a:extLst>
+              <a:ext uri="{FF2B5EF4-FFF2-40B4-BE49-F238E27FC236}">
+                <a16:creationId xmlns:a16="http://schemas.microsoft.com/office/drawing/2014/main" id="{910C56FD-FC6A-B876-1645-2344FE31BADA}"/>
+              </a:ext>
+            </a:extLst>
+          </p:cNvPr>
+          <p:cNvSpPr/>
+          <p:nvPr/>
+        </p:nvSpPr>
+        <p:spPr>
+          <a:xfrm>
+            <a:off x="617203" y="2080336"/>
+            <a:ext cx="2427708" cy="1718098"/>
+          </a:xfrm>
+          <a:prstGeom prst="ellipse">
+            <a:avLst/>
+          </a:prstGeom>
+        </p:spPr>
+        <p:style>
+          <a:lnRef idx="2">
+            <a:schemeClr val="accent6">
+              <a:shade val="15000"/>
+            </a:schemeClr>
+          </a:lnRef>
+          <a:fillRef idx="1">
+            <a:schemeClr val="accent6"/>
+          </a:fillRef>
+          <a:effectRef idx="0">
+            <a:schemeClr val="accent6"/>
+          </a:effectRef>
+          <a:fontRef idx="minor">
+            <a:schemeClr val="lt1"/>
+          </a:fontRef>
+        </p:style>
+        <p:txBody>
+          <a:bodyPr rtlCol="0" anchor="ctr"/>
+          <a:lstStyle/>
+          <a:p>
+            <a:pPr algn="ctr"/>
+            <a:r>
+              <a:rPr lang="en-CA" dirty="0"/>
+              <a:t>Data</a:t>
+            </a:r>
+          </a:p>
+          <a:p>
+            <a:pPr algn="ctr"/>
+            <a:r>
+              <a:rPr lang="en-CA" dirty="0"/>
+              <a:t>On hard drive</a:t>
+            </a:r>
+          </a:p>
+        </p:txBody>
+      </p:sp>
+      <p:sp>
+        <p:nvSpPr>
+          <p:cNvPr id="10" name="Arrow: Right 9">
+            <a:extLst>
+              <a:ext uri="{FF2B5EF4-FFF2-40B4-BE49-F238E27FC236}">
+                <a16:creationId xmlns:a16="http://schemas.microsoft.com/office/drawing/2014/main" id="{1BCF1A2D-2732-5D54-E20B-194AEEB87B36}"/>
+              </a:ext>
+            </a:extLst>
+          </p:cNvPr>
+          <p:cNvSpPr/>
+          <p:nvPr/>
+        </p:nvSpPr>
+        <p:spPr>
+          <a:xfrm>
+            <a:off x="3175060" y="2859442"/>
+            <a:ext cx="2150542" cy="541176"/>
+          </a:xfrm>
+          <a:prstGeom prst="rightArrow">
+            <a:avLst/>
+          </a:prstGeom>
+        </p:spPr>
+        <p:style>
+          <a:lnRef idx="2">
+            <a:schemeClr val="accent6">
+              <a:shade val="15000"/>
+            </a:schemeClr>
+          </a:lnRef>
+          <a:fillRef idx="1">
+            <a:schemeClr val="accent6"/>
+          </a:fillRef>
+          <a:effectRef idx="0">
+            <a:schemeClr val="accent6"/>
+          </a:effectRef>
+          <a:fontRef idx="minor">
+            <a:schemeClr val="lt1"/>
+          </a:fontRef>
+        </p:style>
+        <p:txBody>
+          <a:bodyPr rtlCol="0" anchor="ctr"/>
+          <a:lstStyle/>
+          <a:p>
+            <a:pPr algn="ctr"/>
+            <a:r>
+              <a:rPr lang="en-CA" sz="1600" dirty="0"/>
+              <a:t>Amazing Code</a:t>
+            </a:r>
+          </a:p>
+        </p:txBody>
+      </p:sp>
+      <p:sp>
+        <p:nvSpPr>
+          <p:cNvPr id="8" name="Rectangle: Rounded Corners 7">
+            <a:extLst>
+              <a:ext uri="{FF2B5EF4-FFF2-40B4-BE49-F238E27FC236}">
+                <a16:creationId xmlns:a16="http://schemas.microsoft.com/office/drawing/2014/main" id="{037B2AFA-3814-3AAC-EA83-EDB6969E9D9F}"/>
+              </a:ext>
+            </a:extLst>
+          </p:cNvPr>
+          <p:cNvSpPr/>
+          <p:nvPr/>
+        </p:nvSpPr>
+        <p:spPr>
+          <a:xfrm>
+            <a:off x="5481887" y="2796712"/>
+            <a:ext cx="1539552" cy="1585330"/>
+          </a:xfrm>
+          <a:prstGeom prst="roundRect">
+            <a:avLst/>
+          </a:prstGeom>
+        </p:spPr>
+        <p:style>
+          <a:lnRef idx="1">
+            <a:schemeClr val="accent4"/>
+          </a:lnRef>
+          <a:fillRef idx="2">
+            <a:schemeClr val="accent4"/>
+          </a:fillRef>
+          <a:effectRef idx="1">
+            <a:schemeClr val="accent4"/>
+          </a:effectRef>
+          <a:fontRef idx="minor">
+            <a:schemeClr val="dk1"/>
+          </a:fontRef>
+        </p:style>
+        <p:txBody>
+          <a:bodyPr rtlCol="0" anchor="ctr"/>
+          <a:lstStyle/>
+          <a:p>
+            <a:pPr algn="ctr"/>
+            <a:r>
+              <a:rPr lang="en-CA" dirty="0"/>
+              <a:t>Data format</a:t>
+            </a:r>
+          </a:p>
+          <a:p>
+            <a:pPr algn="ctr"/>
+            <a:r>
+              <a:rPr lang="en-CA" dirty="0"/>
+              <a:t>Because: shader</a:t>
+            </a:r>
+          </a:p>
+        </p:txBody>
+      </p:sp>
+      <p:sp>
+        <p:nvSpPr>
+          <p:cNvPr id="9" name="Arrow: Right 8">
+            <a:extLst>
+              <a:ext uri="{FF2B5EF4-FFF2-40B4-BE49-F238E27FC236}">
+                <a16:creationId xmlns:a16="http://schemas.microsoft.com/office/drawing/2014/main" id="{F871C40B-CE3B-A62F-E9F1-7B1423E24A8C}"/>
+              </a:ext>
+            </a:extLst>
+          </p:cNvPr>
+          <p:cNvSpPr/>
+          <p:nvPr/>
+        </p:nvSpPr>
+        <p:spPr>
+          <a:xfrm>
+            <a:off x="7303423" y="2985835"/>
+            <a:ext cx="1556646" cy="541176"/>
+          </a:xfrm>
+          <a:prstGeom prst="rightArrow">
+            <a:avLst/>
+          </a:prstGeom>
+        </p:spPr>
+        <p:style>
+          <a:lnRef idx="1">
+            <a:schemeClr val="accent4"/>
+          </a:lnRef>
+          <a:fillRef idx="2">
+            <a:schemeClr val="accent4"/>
+          </a:fillRef>
+          <a:effectRef idx="1">
+            <a:schemeClr val="accent4"/>
+          </a:effectRef>
+          <a:fontRef idx="minor">
+            <a:schemeClr val="dk1"/>
+          </a:fontRef>
+        </p:style>
+        <p:txBody>
+          <a:bodyPr rtlCol="0" anchor="ctr"/>
+          <a:lstStyle/>
+          <a:p>
+            <a:pPr algn="ctr"/>
+            <a:endParaRPr lang="en-CA"/>
+          </a:p>
+        </p:txBody>
+      </p:sp>
+      <p:sp>
+        <p:nvSpPr>
+          <p:cNvPr id="12" name="Oval 11">
+            <a:extLst>
+              <a:ext uri="{FF2B5EF4-FFF2-40B4-BE49-F238E27FC236}">
+                <a16:creationId xmlns:a16="http://schemas.microsoft.com/office/drawing/2014/main" id="{8BD8CA10-6736-467D-70FC-D0D9F73232B3}"/>
+              </a:ext>
+            </a:extLst>
+          </p:cNvPr>
+          <p:cNvSpPr/>
+          <p:nvPr/>
+        </p:nvSpPr>
+        <p:spPr>
+          <a:xfrm>
+            <a:off x="487054" y="3909136"/>
+            <a:ext cx="2427708" cy="1718098"/>
+          </a:xfrm>
+          <a:prstGeom prst="ellipse">
+            <a:avLst/>
+          </a:prstGeom>
+        </p:spPr>
+        <p:style>
+          <a:lnRef idx="2">
+            <a:schemeClr val="accent6">
+              <a:shade val="15000"/>
+            </a:schemeClr>
+          </a:lnRef>
+          <a:fillRef idx="1">
+            <a:schemeClr val="accent6"/>
+          </a:fillRef>
+          <a:effectRef idx="0">
+            <a:schemeClr val="accent6"/>
+          </a:effectRef>
+          <a:fontRef idx="minor">
+            <a:schemeClr val="lt1"/>
+          </a:fontRef>
+        </p:style>
+        <p:txBody>
+          <a:bodyPr rtlCol="0" anchor="ctr"/>
+          <a:lstStyle/>
+          <a:p>
+            <a:pPr algn="ctr"/>
+            <a:r>
+              <a:rPr lang="en-CA" dirty="0"/>
+              <a:t>Data</a:t>
+            </a:r>
+          </a:p>
+          <a:p>
+            <a:pPr algn="ctr"/>
+            <a:r>
+              <a:rPr lang="en-CA" dirty="0"/>
+              <a:t>On network</a:t>
+            </a:r>
+          </a:p>
+        </p:txBody>
+      </p:sp>
+      <p:sp>
+        <p:nvSpPr>
+          <p:cNvPr id="13" name="Arrow: Right 12">
+            <a:extLst>
+              <a:ext uri="{FF2B5EF4-FFF2-40B4-BE49-F238E27FC236}">
+                <a16:creationId xmlns:a16="http://schemas.microsoft.com/office/drawing/2014/main" id="{7770F1E1-1F7C-6228-D0F7-76010F9F4C8B}"/>
+              </a:ext>
+            </a:extLst>
+          </p:cNvPr>
+          <p:cNvSpPr/>
+          <p:nvPr/>
+        </p:nvSpPr>
+        <p:spPr>
+          <a:xfrm rot="20340794">
+            <a:off x="3123055" y="4111454"/>
+            <a:ext cx="2150542" cy="541176"/>
+          </a:xfrm>
+          <a:prstGeom prst="rightArrow">
+            <a:avLst/>
+          </a:prstGeom>
+        </p:spPr>
+        <p:style>
+          <a:lnRef idx="2">
+            <a:schemeClr val="accent6">
+              <a:shade val="15000"/>
+            </a:schemeClr>
+          </a:lnRef>
+          <a:fillRef idx="1">
+            <a:schemeClr val="accent6"/>
+          </a:fillRef>
+          <a:effectRef idx="0">
+            <a:schemeClr val="accent6"/>
+          </a:effectRef>
+          <a:fontRef idx="minor">
+            <a:schemeClr val="lt1"/>
+          </a:fontRef>
+        </p:style>
+        <p:txBody>
+          <a:bodyPr rtlCol="0" anchor="ctr"/>
+          <a:lstStyle/>
+          <a:p>
+            <a:pPr algn="ctr"/>
+            <a:r>
+              <a:rPr lang="en-CA" sz="1600" dirty="0"/>
+              <a:t>Amazing Code</a:t>
+            </a:r>
+          </a:p>
+        </p:txBody>
+      </p:sp>
+    </p:spTree>
+    <p:extLst>
+      <p:ext uri="{BB962C8B-B14F-4D97-AF65-F5344CB8AC3E}">
+        <p14:creationId xmlns:p14="http://schemas.microsoft.com/office/powerpoint/2010/main" val="2921537312"/>
+      </p:ext>
+    </p:extLst>
+  </p:cSld>
+  <p:clrMapOvr>
+    <a:masterClrMapping/>
+  </p:clrMapOvr>
+</p:sld>
+</file>
+
+<file path=ppt/slides/slide3.xml><?xml version="1.0" encoding="utf-8"?>
+<p:sld xmlns:a="http://schemas.openxmlformats.org/drawingml/2006/main" xmlns:r="http://schemas.openxmlformats.org/officeDocument/2006/relationships" xmlns:p="http://schemas.openxmlformats.org/presentationml/2006/main">
+  <p:cSld>
+    <p:spTree>
+      <p:nvGrpSpPr>
+        <p:cNvPr id="1" name=""/>
+        <p:cNvGrpSpPr/>
+        <p:nvPr/>
+      </p:nvGrpSpPr>
+      <p:grpSpPr>
+        <a:xfrm>
+          <a:off x="0" y="0"/>
+          <a:ext cx="0" cy="0"/>
+          <a:chOff x="0" y="0"/>
+          <a:chExt cx="0" cy="0"/>
+        </a:xfrm>
+      </p:grpSpPr>
+      <p:sp>
+        <p:nvSpPr>
+          <p:cNvPr id="4" name="Rectangle 3">
+            <a:extLst>
+              <a:ext uri="{FF2B5EF4-FFF2-40B4-BE49-F238E27FC236}">
+                <a16:creationId xmlns:a16="http://schemas.microsoft.com/office/drawing/2014/main" id="{C78498D7-B643-D547-3684-4401B2444926}"/>
+              </a:ext>
+            </a:extLst>
+          </p:cNvPr>
+          <p:cNvSpPr/>
+          <p:nvPr/>
+        </p:nvSpPr>
+        <p:spPr>
+          <a:xfrm>
+            <a:off x="3898835" y="1492315"/>
+            <a:ext cx="4237459" cy="2306119"/>
+          </a:xfrm>
+          <a:prstGeom prst="rect">
+            <a:avLst/>
+          </a:prstGeom>
+        </p:spPr>
+        <p:style>
+          <a:lnRef idx="2">
+            <a:schemeClr val="accent1">
+              <a:shade val="15000"/>
+            </a:schemeClr>
+          </a:lnRef>
+          <a:fillRef idx="1">
+            <a:schemeClr val="accent1"/>
+          </a:fillRef>
+          <a:effectRef idx="0">
+            <a:schemeClr val="accent1"/>
+          </a:effectRef>
+          <a:fontRef idx="minor">
+            <a:schemeClr val="lt1"/>
+          </a:fontRef>
+        </p:style>
+        <p:txBody>
+          <a:bodyPr rtlCol="0" anchor="ctr"/>
+          <a:lstStyle/>
+          <a:p>
+            <a:pPr algn="ctr"/>
+            <a:r>
+              <a:rPr lang="en-CA" dirty="0"/>
+              <a:t>C++ Code</a:t>
+            </a:r>
+          </a:p>
+        </p:txBody>
+      </p:sp>
+      <p:sp>
+        <p:nvSpPr>
+          <p:cNvPr id="5" name="Oval 4">
+            <a:extLst>
+              <a:ext uri="{FF2B5EF4-FFF2-40B4-BE49-F238E27FC236}">
+                <a16:creationId xmlns:a16="http://schemas.microsoft.com/office/drawing/2014/main" id="{3416BF67-40D6-CD77-BE33-79C24F08B9DA}"/>
+              </a:ext>
+            </a:extLst>
+          </p:cNvPr>
+          <p:cNvSpPr/>
+          <p:nvPr/>
+        </p:nvSpPr>
+        <p:spPr>
+          <a:xfrm>
             <a:off x="9171991" y="1408338"/>
             <a:ext cx="2584579" cy="2547841"/>
           </a:xfrm>
@@ -3938,7 +4379,127 @@
 </p:sld>
 </file>
 
-<file path=ppt/slides/slide3.xml><?xml version="1.0" encoding="utf-8"?>
+<file path=ppt/slides/slide4.xml><?xml version="1.0" encoding="utf-8"?>
+<p:sld xmlns:a="http://schemas.openxmlformats.org/drawingml/2006/main" xmlns:r="http://schemas.openxmlformats.org/officeDocument/2006/relationships" xmlns:p="http://schemas.openxmlformats.org/presentationml/2006/main">
+  <p:cSld>
+    <p:spTree>
+      <p:nvGrpSpPr>
+        <p:cNvPr id="1" name=""/>
+        <p:cNvGrpSpPr/>
+        <p:nvPr/>
+      </p:nvGrpSpPr>
+      <p:grpSpPr>
+        <a:xfrm>
+          <a:off x="0" y="0"/>
+          <a:ext cx="0" cy="0"/>
+          <a:chOff x="0" y="0"/>
+          <a:chExt cx="0" cy="0"/>
+        </a:xfrm>
+      </p:grpSpPr>
+      <p:sp>
+        <p:nvSpPr>
+          <p:cNvPr id="2" name="Title 1">
+            <a:extLst>
+              <a:ext uri="{FF2B5EF4-FFF2-40B4-BE49-F238E27FC236}">
+                <a16:creationId xmlns:a16="http://schemas.microsoft.com/office/drawing/2014/main" id="{CF21B3F2-FC11-ADFD-060D-E700F41EA2E9}"/>
+              </a:ext>
+            </a:extLst>
+          </p:cNvPr>
+          <p:cNvSpPr>
+            <a:spLocks noGrp="1"/>
+          </p:cNvSpPr>
+          <p:nvPr>
+            <p:ph type="title"/>
+          </p:nvPr>
+        </p:nvSpPr>
+        <p:spPr/>
+        <p:txBody>
+          <a:bodyPr/>
+          <a:lstStyle/>
+          <a:p>
+            <a:r>
+              <a:rPr lang="en-CA" dirty="0"/>
+              <a:t>Options to load</a:t>
+            </a:r>
+          </a:p>
+        </p:txBody>
+      </p:sp>
+      <p:sp>
+        <p:nvSpPr>
+          <p:cNvPr id="3" name="Content Placeholder 2">
+            <a:extLst>
+              <a:ext uri="{FF2B5EF4-FFF2-40B4-BE49-F238E27FC236}">
+                <a16:creationId xmlns:a16="http://schemas.microsoft.com/office/drawing/2014/main" id="{193406DA-2D80-BFE9-8329-0C70A3D366FB}"/>
+              </a:ext>
+            </a:extLst>
+          </p:cNvPr>
+          <p:cNvSpPr>
+            <a:spLocks noGrp="1"/>
+          </p:cNvSpPr>
+          <p:nvPr>
+            <p:ph idx="1"/>
+          </p:nvPr>
+        </p:nvSpPr>
+        <p:spPr/>
+        <p:txBody>
+          <a:bodyPr/>
+          <a:lstStyle/>
+          <a:p>
+            <a:r>
+              <a:rPr lang="en-CA" dirty="0"/>
+              <a:t>Use/write a loader that detects what type of file it is (hardest)</a:t>
+            </a:r>
+          </a:p>
+          <a:p>
+            <a:pPr lvl="1"/>
+            <a:r>
+              <a:rPr lang="en-CA" dirty="0"/>
+              <a:t>When we use </a:t>
+            </a:r>
+            <a:r>
+              <a:rPr lang="en-CA" dirty="0" err="1"/>
+              <a:t>assimp</a:t>
+            </a:r>
+            <a:r>
+              <a:rPr lang="en-CA" dirty="0"/>
+              <a:t>, this is what happens.</a:t>
+            </a:r>
+          </a:p>
+          <a:p>
+            <a:r>
+              <a:rPr lang="en-CA" dirty="0"/>
+              <a:t>Multiple loaders and we specifically call them (easiest)</a:t>
+            </a:r>
+          </a:p>
+          <a:p>
+            <a:r>
+              <a:rPr lang="en-CA" dirty="0"/>
+              <a:t>Convert the models into one known format.</a:t>
+            </a:r>
+          </a:p>
+          <a:p>
+            <a:pPr lvl="1"/>
+            <a:r>
+              <a:rPr lang="en-CA" dirty="0"/>
+              <a:t>If it’s not that format, then… everything ends in  tears.</a:t>
+            </a:r>
+          </a:p>
+        </p:txBody>
+      </p:sp>
+    </p:spTree>
+    <p:extLst>
+      <p:ext uri="{BB962C8B-B14F-4D97-AF65-F5344CB8AC3E}">
+        <p14:creationId xmlns:p14="http://schemas.microsoft.com/office/powerpoint/2010/main" val="2743671370"/>
+      </p:ext>
+    </p:extLst>
+  </p:cSld>
+  <p:clrMapOvr>
+    <a:masterClrMapping/>
+  </p:clrMapOvr>
+</p:sld>
+</file>
+
+<file path=ppt/slides/slide5.xml><?xml version="1.0" encoding="utf-8"?>
 <p:sld xmlns:a="http://schemas.openxmlformats.org/drawingml/2006/main" xmlns:r="http://schemas.openxmlformats.org/officeDocument/2006/relationships" xmlns:p="http://schemas.openxmlformats.org/presentationml/2006/main">
   <p:cSld>
     <p:spTree>

</xml_diff>